<commit_message>
Update 1.7 and 1.8 documentation  1 (1).pptx
</commit_message>
<xml_diff>
--- a/PPT/1.7 and 1.8 documentation  1 (1).pptx
+++ b/PPT/1.7 and 1.8 documentation  1 (1).pptx
@@ -140,10 +140,40 @@
   <pc:docChgLst>
     <pc:chgData name="Thomas Xu" userId="72a40c57-58f8-4deb-8f71-c52d4941dc1d" providerId="ADAL" clId="{382A3C6E-F3B3-4283-A8A4-1F7285F3E9A4}"/>
     <pc:docChg chg="custSel modSld">
-      <pc:chgData name="Thomas Xu" userId="72a40c57-58f8-4deb-8f71-c52d4941dc1d" providerId="ADAL" clId="{382A3C6E-F3B3-4283-A8A4-1F7285F3E9A4}" dt="2023-05-21T07:35:46.366" v="80" actId="20577"/>
+      <pc:chgData name="Thomas Xu" userId="72a40c57-58f8-4deb-8f71-c52d4941dc1d" providerId="ADAL" clId="{382A3C6E-F3B3-4283-A8A4-1F7285F3E9A4}" dt="2023-05-21T08:58:21.330" v="140" actId="1076"/>
       <pc:docMkLst>
         <pc:docMk/>
       </pc:docMkLst>
+      <pc:sldChg chg="modSp mod">
+        <pc:chgData name="Thomas Xu" userId="72a40c57-58f8-4deb-8f71-c52d4941dc1d" providerId="ADAL" clId="{382A3C6E-F3B3-4283-A8A4-1F7285F3E9A4}" dt="2023-05-21T08:58:03.739" v="139" actId="20577"/>
+        <pc:sldMkLst>
+          <pc:docMk/>
+          <pc:sldMk cId="0" sldId="268"/>
+        </pc:sldMkLst>
+        <pc:spChg chg="mod">
+          <ac:chgData name="Thomas Xu" userId="72a40c57-58f8-4deb-8f71-c52d4941dc1d" providerId="ADAL" clId="{382A3C6E-F3B3-4283-A8A4-1F7285F3E9A4}" dt="2023-05-21T08:58:03.739" v="139" actId="20577"/>
+          <ac:spMkLst>
+            <pc:docMk/>
+            <pc:sldMk cId="0" sldId="268"/>
+            <ac:spMk id="86" creationId="{00000000-0000-0000-0000-000000000000}"/>
+          </ac:spMkLst>
+        </pc:spChg>
+      </pc:sldChg>
+      <pc:sldChg chg="modSp mod">
+        <pc:chgData name="Thomas Xu" userId="72a40c57-58f8-4deb-8f71-c52d4941dc1d" providerId="ADAL" clId="{382A3C6E-F3B3-4283-A8A4-1F7285F3E9A4}" dt="2023-05-21T08:58:21.330" v="140" actId="1076"/>
+        <pc:sldMkLst>
+          <pc:docMk/>
+          <pc:sldMk cId="1053444694" sldId="270"/>
+        </pc:sldMkLst>
+        <pc:spChg chg="mod">
+          <ac:chgData name="Thomas Xu" userId="72a40c57-58f8-4deb-8f71-c52d4941dc1d" providerId="ADAL" clId="{382A3C6E-F3B3-4283-A8A4-1F7285F3E9A4}" dt="2023-05-21T08:58:21.330" v="140" actId="1076"/>
+          <ac:spMkLst>
+            <pc:docMk/>
+            <pc:sldMk cId="1053444694" sldId="270"/>
+            <ac:spMk id="2" creationId="{0D168B5A-EFF4-4803-8DA6-5994B306EBAF}"/>
+          </ac:spMkLst>
+        </pc:spChg>
+      </pc:sldChg>
       <pc:sldChg chg="modSp mod">
         <pc:chgData name="Thomas Xu" userId="72a40c57-58f8-4deb-8f71-c52d4941dc1d" providerId="ADAL" clId="{382A3C6E-F3B3-4283-A8A4-1F7285F3E9A4}" dt="2023-05-21T06:09:30.300" v="0" actId="1076"/>
         <pc:sldMkLst>
@@ -5495,7 +5525,7 @@
         </p:nvSpPr>
         <p:spPr>
           <a:xfrm>
-            <a:off x="838200" y="365125"/>
+            <a:off x="838200" y="300470"/>
             <a:ext cx="10515600" cy="640715"/>
           </a:xfrm>
         </p:spPr>
@@ -7014,7 +7044,7 @@
           <a:p>
             <a:r>
               <a:rPr lang="en" sz="4000" dirty="0"/>
-              <a:t>[Component name] (Trello screenshot)</a:t>
+              <a:t>[Component 1] (Instruction&amp;yes/no checker)</a:t>
             </a:r>
             <a:endParaRPr sz="4000" dirty="0"/>
           </a:p>
@@ -8872,18 +8902,18 @@
 </file>
 
 <file path=customXml/item1.xml><?xml version="1.0" encoding="utf-8"?>
+<p:properties xmlns:p="http://schemas.microsoft.com/office/2006/metadata/properties" xmlns:xsi="http://www.w3.org/2001/XMLSchema-instance" xmlns:pc="http://schemas.microsoft.com/office/infopath/2007/PartnerControls">
+  <documentManagement/>
+</p:properties>
+</file>
+
+<file path=customXml/item2.xml><?xml version="1.0" encoding="utf-8"?>
 <?mso-contentType ?>
 <FormTemplates xmlns="http://schemas.microsoft.com/sharepoint/v3/contenttype/forms">
   <Display>DocumentLibraryForm</Display>
   <Edit>DocumentLibraryForm</Edit>
   <New>DocumentLibraryForm</New>
 </FormTemplates>
-</file>
-
-<file path=customXml/item2.xml><?xml version="1.0" encoding="utf-8"?>
-<p:properties xmlns:p="http://schemas.microsoft.com/office/2006/metadata/properties" xmlns:xsi="http://www.w3.org/2001/XMLSchema-instance" xmlns:pc="http://schemas.microsoft.com/office/infopath/2007/PartnerControls">
-  <documentManagement/>
-</p:properties>
 </file>
 
 <file path=customXml/item3.xml><?xml version="1.0" encoding="utf-8"?>
@@ -9110,14 +9140,6 @@
 </file>
 
 <file path=customXml/itemProps1.xml><?xml version="1.0" encoding="utf-8"?>
-<ds:datastoreItem xmlns:ds="http://schemas.openxmlformats.org/officeDocument/2006/customXml" ds:itemID="{996D3308-852E-4C8B-B252-FF4AAFB3F53B}">
-  <ds:schemaRefs>
-    <ds:schemaRef ds:uri="http://schemas.microsoft.com/sharepoint/v3/contenttype/forms"/>
-  </ds:schemaRefs>
-</ds:datastoreItem>
-</file>
-
-<file path=customXml/itemProps2.xml><?xml version="1.0" encoding="utf-8"?>
 <ds:datastoreItem xmlns:ds="http://schemas.openxmlformats.org/officeDocument/2006/customXml" ds:itemID="{D3E43842-9024-4A34-8C28-3EA5A3BEB66C}">
   <ds:schemaRefs>
     <ds:schemaRef ds:uri="http://schemas.microsoft.com/office/2006/documentManagement/types"/>
@@ -9130,6 +9152,14 @@
     <ds:schemaRef ds:uri="http://www.w3.org/XML/1998/namespace"/>
     <ds:schemaRef ds:uri="http://purl.org/dc/elements/1.1/"/>
     <ds:schemaRef ds:uri="e64b035b-d3bf-4281-aae9-e2992bd2c409"/>
+  </ds:schemaRefs>
+</ds:datastoreItem>
+</file>
+
+<file path=customXml/itemProps2.xml><?xml version="1.0" encoding="utf-8"?>
+<ds:datastoreItem xmlns:ds="http://schemas.openxmlformats.org/officeDocument/2006/customXml" ds:itemID="{996D3308-852E-4C8B-B252-FF4AAFB3F53B}">
+  <ds:schemaRefs>
+    <ds:schemaRef ds:uri="http://schemas.microsoft.com/sharepoint/v3/contenttype/forms"/>
   </ds:schemaRefs>
 </ds:datastoreItem>
 </file>

</xml_diff>